<commit_message>
new common mode reduction method
matlab model is created, a presentation is created
</commit_message>
<xml_diff>
--- a/Switching Function - Reduced CMV PWM/OnlineCPSCalculation.pptx
+++ b/Switching Function - Reduced CMV PWM/OnlineCPSCalculation.pptx
@@ -5,7 +5,7 @@
     <p:sldMasterId id="2147483648" r:id="rId1"/>
   </p:sldMasterIdLst>
   <p:notesMasterIdLst>
-    <p:notesMasterId r:id="rId20"/>
+    <p:notesMasterId r:id="rId22"/>
   </p:notesMasterIdLst>
   <p:sldIdLst>
     <p:sldId id="256" r:id="rId2"/>
@@ -26,6 +26,8 @@
     <p:sldId id="273" r:id="rId17"/>
     <p:sldId id="272" r:id="rId18"/>
     <p:sldId id="274" r:id="rId19"/>
+    <p:sldId id="275" r:id="rId20"/>
+    <p:sldId id="276" r:id="rId21"/>
   </p:sldIdLst>
   <p:sldSz cx="12192000" cy="6858000"/>
   <p:notesSz cx="6858000" cy="9144000"/>
@@ -214,7 +216,7 @@
           <a:p>
             <a:fld id="{CAC3C920-8099-44FB-877D-FFD02840B4C1}" type="datetimeFigureOut">
               <a:rPr lang="sv-SE" smtClean="0"/>
-              <a:t>2023-06-08</a:t>
+              <a:t>2023-07-04</a:t>
             </a:fld>
             <a:endParaRPr lang="sv-SE"/>
           </a:p>
@@ -1033,7 +1035,7 @@
           <a:p>
             <a:fld id="{1CCF258A-C4AC-452A-B440-6EC022A8E4C9}" type="datetimeFigureOut">
               <a:rPr lang="sv-SE" smtClean="0"/>
-              <a:t>2023-06-08</a:t>
+              <a:t>2023-07-04</a:t>
             </a:fld>
             <a:endParaRPr lang="sv-SE"/>
           </a:p>
@@ -1203,7 +1205,7 @@
           <a:p>
             <a:fld id="{1CCF258A-C4AC-452A-B440-6EC022A8E4C9}" type="datetimeFigureOut">
               <a:rPr lang="sv-SE" smtClean="0"/>
-              <a:t>2023-06-08</a:t>
+              <a:t>2023-07-04</a:t>
             </a:fld>
             <a:endParaRPr lang="sv-SE"/>
           </a:p>
@@ -1383,7 +1385,7 @@
           <a:p>
             <a:fld id="{1CCF258A-C4AC-452A-B440-6EC022A8E4C9}" type="datetimeFigureOut">
               <a:rPr lang="sv-SE" smtClean="0"/>
-              <a:t>2023-06-08</a:t>
+              <a:t>2023-07-04</a:t>
             </a:fld>
             <a:endParaRPr lang="sv-SE"/>
           </a:p>
@@ -1553,7 +1555,7 @@
           <a:p>
             <a:fld id="{1CCF258A-C4AC-452A-B440-6EC022A8E4C9}" type="datetimeFigureOut">
               <a:rPr lang="sv-SE" smtClean="0"/>
-              <a:t>2023-06-08</a:t>
+              <a:t>2023-07-04</a:t>
             </a:fld>
             <a:endParaRPr lang="sv-SE"/>
           </a:p>
@@ -1799,7 +1801,7 @@
           <a:p>
             <a:fld id="{1CCF258A-C4AC-452A-B440-6EC022A8E4C9}" type="datetimeFigureOut">
               <a:rPr lang="sv-SE" smtClean="0"/>
-              <a:t>2023-06-08</a:t>
+              <a:t>2023-07-04</a:t>
             </a:fld>
             <a:endParaRPr lang="sv-SE"/>
           </a:p>
@@ -2031,7 +2033,7 @@
           <a:p>
             <a:fld id="{1CCF258A-C4AC-452A-B440-6EC022A8E4C9}" type="datetimeFigureOut">
               <a:rPr lang="sv-SE" smtClean="0"/>
-              <a:t>2023-06-08</a:t>
+              <a:t>2023-07-04</a:t>
             </a:fld>
             <a:endParaRPr lang="sv-SE"/>
           </a:p>
@@ -2398,7 +2400,7 @@
           <a:p>
             <a:fld id="{1CCF258A-C4AC-452A-B440-6EC022A8E4C9}" type="datetimeFigureOut">
               <a:rPr lang="sv-SE" smtClean="0"/>
-              <a:t>2023-06-08</a:t>
+              <a:t>2023-07-04</a:t>
             </a:fld>
             <a:endParaRPr lang="sv-SE"/>
           </a:p>
@@ -2516,7 +2518,7 @@
           <a:p>
             <a:fld id="{1CCF258A-C4AC-452A-B440-6EC022A8E4C9}" type="datetimeFigureOut">
               <a:rPr lang="sv-SE" smtClean="0"/>
-              <a:t>2023-06-08</a:t>
+              <a:t>2023-07-04</a:t>
             </a:fld>
             <a:endParaRPr lang="sv-SE"/>
           </a:p>
@@ -2611,7 +2613,7 @@
           <a:p>
             <a:fld id="{1CCF258A-C4AC-452A-B440-6EC022A8E4C9}" type="datetimeFigureOut">
               <a:rPr lang="sv-SE" smtClean="0"/>
-              <a:t>2023-06-08</a:t>
+              <a:t>2023-07-04</a:t>
             </a:fld>
             <a:endParaRPr lang="sv-SE"/>
           </a:p>
@@ -2888,7 +2890,7 @@
           <a:p>
             <a:fld id="{1CCF258A-C4AC-452A-B440-6EC022A8E4C9}" type="datetimeFigureOut">
               <a:rPr lang="sv-SE" smtClean="0"/>
-              <a:t>2023-06-08</a:t>
+              <a:t>2023-07-04</a:t>
             </a:fld>
             <a:endParaRPr lang="sv-SE"/>
           </a:p>
@@ -3141,7 +3143,7 @@
           <a:p>
             <a:fld id="{1CCF258A-C4AC-452A-B440-6EC022A8E4C9}" type="datetimeFigureOut">
               <a:rPr lang="sv-SE" smtClean="0"/>
-              <a:t>2023-06-08</a:t>
+              <a:t>2023-07-04</a:t>
             </a:fld>
             <a:endParaRPr lang="sv-SE"/>
           </a:p>
@@ -3354,7 +3356,7 @@
           <a:p>
             <a:fld id="{1CCF258A-C4AC-452A-B440-6EC022A8E4C9}" type="datetimeFigureOut">
               <a:rPr lang="sv-SE" smtClean="0"/>
-              <a:t>2023-06-08</a:t>
+              <a:t>2023-07-04</a:t>
             </a:fld>
             <a:endParaRPr lang="sv-SE"/>
           </a:p>
@@ -15409,17 +15411,100 @@
           <a:p>
             <a:r>
               <a:rPr lang="en-US" dirty="0"/>
-              <a:t>CMV Comparisons</a:t>
-            </a:r>
+              <a:t>CMV </a:t>
+            </a:r>
+            <a:r>
+              <a:rPr lang="en-US" dirty="0" smtClean="0"/>
+              <a:t>Comparisons- Equal Carrier Phases </a:t>
+            </a:r>
+            <a:endParaRPr lang="en-US" dirty="0"/>
           </a:p>
         </p:txBody>
       </p:sp>
+      <p:pic>
+        <p:nvPicPr>
+          <p:cNvPr id="4" name="Picture 3"/>
+          <p:cNvPicPr>
+            <a:picLocks noChangeAspect="1"/>
+          </p:cNvPicPr>
+          <p:nvPr/>
+        </p:nvPicPr>
+        <p:blipFill>
+          <a:blip r:embed="rId2"/>
+          <a:stretch>
+            <a:fillRect/>
+          </a:stretch>
+        </p:blipFill>
+        <p:spPr>
+          <a:xfrm>
+            <a:off x="439823" y="1786338"/>
+            <a:ext cx="5960977" cy="4216965"/>
+          </a:xfrm>
+          <a:prstGeom prst="rect">
+            <a:avLst/>
+          </a:prstGeom>
+        </p:spPr>
+      </p:pic>
+      <p:pic>
+        <p:nvPicPr>
+          <p:cNvPr id="5" name="Picture 4"/>
+          <p:cNvPicPr>
+            <a:picLocks noChangeAspect="1"/>
+          </p:cNvPicPr>
+          <p:nvPr/>
+        </p:nvPicPr>
+        <p:blipFill>
+          <a:blip r:embed="rId3"/>
+          <a:stretch>
+            <a:fillRect/>
+          </a:stretch>
+        </p:blipFill>
+        <p:spPr>
+          <a:xfrm>
+            <a:off x="6550240" y="1989438"/>
+            <a:ext cx="5145346" cy="3639965"/>
+          </a:xfrm>
+          <a:prstGeom prst="rect">
+            <a:avLst/>
+          </a:prstGeom>
+        </p:spPr>
+      </p:pic>
+    </p:spTree>
+    <p:extLst>
+      <p:ext uri="{BB962C8B-B14F-4D97-AF65-F5344CB8AC3E}">
+        <p14:creationId xmlns:p14="http://schemas.microsoft.com/office/powerpoint/2010/main" val="2974356112"/>
+      </p:ext>
+    </p:extLst>
+  </p:cSld>
+  <p:clrMapOvr>
+    <a:masterClrMapping/>
+  </p:clrMapOvr>
+</p:sld>
+</file>
+
+<file path=ppt/slides/slide19.xml><?xml version="1.0" encoding="utf-8"?>
+<p:sld xmlns:a="http://schemas.openxmlformats.org/drawingml/2006/main" xmlns:r="http://schemas.openxmlformats.org/officeDocument/2006/relationships" xmlns:p="http://schemas.openxmlformats.org/presentationml/2006/main">
+  <p:cSld>
+    <p:spTree>
+      <p:nvGrpSpPr>
+        <p:cNvPr id="1" name=""/>
+        <p:cNvGrpSpPr/>
+        <p:nvPr/>
+      </p:nvGrpSpPr>
+      <p:grpSpPr>
+        <a:xfrm>
+          <a:off x="0" y="0"/>
+          <a:ext cx="0" cy="0"/>
+          <a:chOff x="0" y="0"/>
+          <a:chExt cx="0" cy="0"/>
+        </a:xfrm>
+      </p:grpSpPr>
       <p:sp>
         <p:nvSpPr>
-          <p:cNvPr id="3" name="Content Placeholder 2">
+          <p:cNvPr id="2" name="Title 1">
             <a:extLst>
               <a:ext uri="{FF2B5EF4-FFF2-40B4-BE49-F238E27FC236}">
-                <a16:creationId xmlns:a16="http://schemas.microsoft.com/office/drawing/2014/main" id="{1001C2D4-13E0-4D08-A520-7A8411638F47}"/>
+                <a16:creationId xmlns:a16="http://schemas.microsoft.com/office/drawing/2014/main" id="{D4895984-4E8D-402F-9F27-442F41C97674}"/>
               </a:ext>
             </a:extLst>
           </p:cNvPr>
@@ -15427,7 +15512,7 @@
             <a:spLocks noGrp="1"/>
           </p:cNvSpPr>
           <p:nvPr>
-            <p:ph idx="1"/>
+            <p:ph type="title"/>
           </p:nvPr>
         </p:nvSpPr>
         <p:spPr/>
@@ -15435,14 +15520,70 @@
           <a:bodyPr/>
           <a:lstStyle/>
           <a:p>
-            <a:endParaRPr lang="en-US"/>
+            <a:r>
+              <a:rPr lang="en-US" dirty="0"/>
+              <a:t>CMV </a:t>
+            </a:r>
+            <a:r>
+              <a:rPr lang="en-US" dirty="0" smtClean="0"/>
+              <a:t>Comparisons- 0-120-240 carrier phases</a:t>
+            </a:r>
+            <a:endParaRPr lang="en-US" dirty="0"/>
           </a:p>
         </p:txBody>
       </p:sp>
+      <p:pic>
+        <p:nvPicPr>
+          <p:cNvPr id="7" name="Picture 6"/>
+          <p:cNvPicPr>
+            <a:picLocks noChangeAspect="1"/>
+          </p:cNvPicPr>
+          <p:nvPr/>
+        </p:nvPicPr>
+        <p:blipFill>
+          <a:blip r:embed="rId2"/>
+          <a:stretch>
+            <a:fillRect/>
+          </a:stretch>
+        </p:blipFill>
+        <p:spPr>
+          <a:xfrm>
+            <a:off x="490538" y="1825174"/>
+            <a:ext cx="5424488" cy="3837438"/>
+          </a:xfrm>
+          <a:prstGeom prst="rect">
+            <a:avLst/>
+          </a:prstGeom>
+        </p:spPr>
+      </p:pic>
+      <p:pic>
+        <p:nvPicPr>
+          <p:cNvPr id="8" name="Picture 7"/>
+          <p:cNvPicPr>
+            <a:picLocks noChangeAspect="1"/>
+          </p:cNvPicPr>
+          <p:nvPr/>
+        </p:nvPicPr>
+        <p:blipFill>
+          <a:blip r:embed="rId3"/>
+          <a:stretch>
+            <a:fillRect/>
+          </a:stretch>
+        </p:blipFill>
+        <p:spPr>
+          <a:xfrm>
+            <a:off x="6096001" y="1862095"/>
+            <a:ext cx="5467350" cy="3867759"/>
+          </a:xfrm>
+          <a:prstGeom prst="rect">
+            <a:avLst/>
+          </a:prstGeom>
+        </p:spPr>
+      </p:pic>
     </p:spTree>
     <p:extLst>
       <p:ext uri="{BB962C8B-B14F-4D97-AF65-F5344CB8AC3E}">
-        <p14:creationId xmlns:p14="http://schemas.microsoft.com/office/powerpoint/2010/main" val="2974356112"/>
+        <p14:creationId xmlns:p14="http://schemas.microsoft.com/office/powerpoint/2010/main" val="3399550747"/>
       </p:ext>
     </p:extLst>
   </p:cSld>
@@ -16103,6 +16244,117 @@
     <p:extLst>
       <p:ext uri="{BB962C8B-B14F-4D97-AF65-F5344CB8AC3E}">
         <p14:creationId xmlns:p14="http://schemas.microsoft.com/office/powerpoint/2010/main" val="1511039753"/>
+      </p:ext>
+    </p:extLst>
+  </p:cSld>
+  <p:clrMapOvr>
+    <a:masterClrMapping/>
+  </p:clrMapOvr>
+</p:sld>
+</file>
+
+<file path=ppt/slides/slide20.xml><?xml version="1.0" encoding="utf-8"?>
+<p:sld xmlns:a="http://schemas.openxmlformats.org/drawingml/2006/main" xmlns:r="http://schemas.openxmlformats.org/officeDocument/2006/relationships" xmlns:p="http://schemas.openxmlformats.org/presentationml/2006/main">
+  <p:cSld>
+    <p:spTree>
+      <p:nvGrpSpPr>
+        <p:cNvPr id="1" name=""/>
+        <p:cNvGrpSpPr/>
+        <p:nvPr/>
+      </p:nvGrpSpPr>
+      <p:grpSpPr>
+        <a:xfrm>
+          <a:off x="0" y="0"/>
+          <a:ext cx="0" cy="0"/>
+          <a:chOff x="0" y="0"/>
+          <a:chExt cx="0" cy="0"/>
+        </a:xfrm>
+      </p:grpSpPr>
+      <p:sp>
+        <p:nvSpPr>
+          <p:cNvPr id="2" name="Title 1">
+            <a:extLst>
+              <a:ext uri="{FF2B5EF4-FFF2-40B4-BE49-F238E27FC236}">
+                <a16:creationId xmlns:a16="http://schemas.microsoft.com/office/drawing/2014/main" id="{D4895984-4E8D-402F-9F27-442F41C97674}"/>
+              </a:ext>
+            </a:extLst>
+          </p:cNvPr>
+          <p:cNvSpPr>
+            <a:spLocks noGrp="1"/>
+          </p:cNvSpPr>
+          <p:nvPr>
+            <p:ph type="title"/>
+          </p:nvPr>
+        </p:nvSpPr>
+        <p:spPr/>
+        <p:txBody>
+          <a:bodyPr/>
+          <a:lstStyle/>
+          <a:p>
+            <a:r>
+              <a:rPr lang="en-US" dirty="0"/>
+              <a:t>CMV </a:t>
+            </a:r>
+            <a:r>
+              <a:rPr lang="en-US" dirty="0" smtClean="0"/>
+              <a:t>Comparisons- Variable</a:t>
+            </a:r>
+            <a:endParaRPr lang="en-US" dirty="0"/>
+          </a:p>
+        </p:txBody>
+      </p:sp>
+      <p:pic>
+        <p:nvPicPr>
+          <p:cNvPr id="3" name="Picture 2"/>
+          <p:cNvPicPr>
+            <a:picLocks noChangeAspect="1"/>
+          </p:cNvPicPr>
+          <p:nvPr/>
+        </p:nvPicPr>
+        <p:blipFill>
+          <a:blip r:embed="rId2"/>
+          <a:stretch>
+            <a:fillRect/>
+          </a:stretch>
+        </p:blipFill>
+        <p:spPr>
+          <a:xfrm>
+            <a:off x="209550" y="1622194"/>
+            <a:ext cx="5886450" cy="4164243"/>
+          </a:xfrm>
+          <a:prstGeom prst="rect">
+            <a:avLst/>
+          </a:prstGeom>
+        </p:spPr>
+      </p:pic>
+      <p:pic>
+        <p:nvPicPr>
+          <p:cNvPr id="4" name="Picture 3"/>
+          <p:cNvPicPr>
+            <a:picLocks noChangeAspect="1"/>
+          </p:cNvPicPr>
+          <p:nvPr/>
+        </p:nvPicPr>
+        <p:blipFill>
+          <a:blip r:embed="rId3"/>
+          <a:stretch>
+            <a:fillRect/>
+          </a:stretch>
+        </p:blipFill>
+        <p:spPr>
+          <a:xfrm>
+            <a:off x="6406973" y="2057400"/>
+            <a:ext cx="4946827" cy="3499527"/>
+          </a:xfrm>
+          <a:prstGeom prst="rect">
+            <a:avLst/>
+          </a:prstGeom>
+        </p:spPr>
+      </p:pic>
+    </p:spTree>
+    <p:extLst>
+      <p:ext uri="{BB962C8B-B14F-4D97-AF65-F5344CB8AC3E}">
+        <p14:creationId xmlns:p14="http://schemas.microsoft.com/office/powerpoint/2010/main" val="610714819"/>
       </p:ext>
     </p:extLst>
   </p:cSld>
@@ -20131,13 +20383,7 @@
                         <a:rPr lang="en-US" b="0" i="1" smtClean="0">
                           <a:latin typeface="Cambria Math" panose="02040503050406030204" pitchFamily="18" charset="0"/>
                         </a:rPr>
-                        <m:t>=</m:t>
-                      </m:r>
-                      <m:r>
-                        <a:rPr lang="en-US" b="0" i="1" smtClean="0">
-                          <a:latin typeface="Cambria Math" panose="02040503050406030204" pitchFamily="18" charset="0"/>
-                        </a:rPr>
-                        <m:t>0</m:t>
+                        <m:t>=0</m:t>
                       </m:r>
                     </m:oMath>
                   </m:oMathPara>

</xml_diff>